<commit_message>
update presentation - Anna's part
</commit_message>
<xml_diff>
--- a/Forex Presentation.pptx
+++ b/Forex Presentation.pptx
@@ -9,6 +9,11 @@
     <p:sldId id="257" r:id="rId3"/>
     <p:sldId id="258" r:id="rId4"/>
     <p:sldId id="259" r:id="rId5"/>
+    <p:sldId id="260" r:id="rId6"/>
+    <p:sldId id="261" r:id="rId7"/>
+    <p:sldId id="262" r:id="rId8"/>
+    <p:sldId id="263" r:id="rId9"/>
+    <p:sldId id="264" r:id="rId10"/>
   </p:sldIdLst>
   <p:sldSz cx="12192000" cy="6858000"/>
   <p:notesSz cx="6858000" cy="9144000"/>
@@ -107,7 +112,20 @@
       </a:defRPr>
     </a:lvl9pPr>
   </p:defaultTextStyle>
+  <p:extLst>
+    <p:ext uri="{EFAFB233-063F-42B5-8137-9DF3F51BA10A}">
+      <p15:sldGuideLst xmlns:p15="http://schemas.microsoft.com/office/powerpoint/2012/main"/>
+    </p:ext>
+  </p:extLst>
 </p:presentation>
+</file>
+
+<file path=ppt/revisionInfo.xml><?xml version="1.0" encoding="utf-8"?>
+<p1510:revInfo xmlns:a="http://schemas.openxmlformats.org/drawingml/2006/main" xmlns:r="http://schemas.openxmlformats.org/officeDocument/2006/relationships" xmlns:p1510="http://schemas.microsoft.com/office/powerpoint/2015/10/main">
+  <p1510:revLst>
+    <p1510:client id="{02748BFB-4820-31AB-D1A7-3C4D07BB1DF0}" v="857" dt="2023-09-22T09:37:45.477"/>
+  </p1510:revLst>
+</p1510:revInfo>
 </file>
 
 <file path=ppt/diagrams/colors1.xml><?xml version="1.0" encoding="utf-8"?>
@@ -2916,7 +2934,7 @@
           <a:p>
             <a:fld id="{48A87A34-81AB-432B-8DAE-1953F412C126}" type="datetimeFigureOut">
               <a:rPr lang="en-US" dirty="0"/>
-              <a:t>9/22/23</a:t>
+              <a:t>9/22/2023</a:t>
             </a:fld>
             <a:endParaRPr lang="en-US" dirty="0"/>
           </a:p>
@@ -3178,7 +3196,7 @@
           <a:p>
             <a:fld id="{48A87A34-81AB-432B-8DAE-1953F412C126}" type="datetimeFigureOut">
               <a:rPr lang="en-US" dirty="0"/>
-              <a:t>9/22/23</a:t>
+              <a:t>9/22/2023</a:t>
             </a:fld>
             <a:endParaRPr lang="en-US" dirty="0"/>
           </a:p>
@@ -3405,7 +3423,7 @@
             <a:fld id="{48A87A34-81AB-432B-8DAE-1953F412C126}" type="datetimeFigureOut">
               <a:rPr lang="en-US" dirty="0"/>
               <a:pPr/>
-              <a:t>9/22/23</a:t>
+              <a:t>9/22/2023</a:t>
             </a:fld>
             <a:endParaRPr lang="en-US" dirty="0"/>
           </a:p>
@@ -3711,7 +3729,7 @@
             <a:fld id="{48A87A34-81AB-432B-8DAE-1953F412C126}" type="datetimeFigureOut">
               <a:rPr lang="en-US" dirty="0"/>
               <a:pPr/>
-              <a:t>9/22/23</a:t>
+              <a:t>9/22/2023</a:t>
             </a:fld>
             <a:endParaRPr lang="en-US" dirty="0"/>
           </a:p>
@@ -4180,7 +4198,7 @@
             <a:fld id="{48A87A34-81AB-432B-8DAE-1953F412C126}" type="datetimeFigureOut">
               <a:rPr lang="en-US" dirty="0"/>
               <a:pPr/>
-              <a:t>9/22/23</a:t>
+              <a:t>9/22/2023</a:t>
             </a:fld>
             <a:endParaRPr lang="en-US" dirty="0"/>
           </a:p>
@@ -4722,7 +4740,7 @@
           <a:p>
             <a:fld id="{48A87A34-81AB-432B-8DAE-1953F412C126}" type="datetimeFigureOut">
               <a:rPr lang="en-US" dirty="0"/>
-              <a:t>9/22/23</a:t>
+              <a:t>9/22/2023</a:t>
             </a:fld>
             <a:endParaRPr lang="en-US" dirty="0"/>
           </a:p>
@@ -5491,7 +5509,7 @@
           <a:p>
             <a:fld id="{48A87A34-81AB-432B-8DAE-1953F412C126}" type="datetimeFigureOut">
               <a:rPr lang="en-US" dirty="0"/>
-              <a:t>9/22/23</a:t>
+              <a:t>9/22/2023</a:t>
             </a:fld>
             <a:endParaRPr lang="en-US" dirty="0"/>
           </a:p>
@@ -5661,7 +5679,7 @@
           <a:p>
             <a:fld id="{48A87A34-81AB-432B-8DAE-1953F412C126}" type="datetimeFigureOut">
               <a:rPr lang="en-US" dirty="0"/>
-              <a:t>9/22/23</a:t>
+              <a:t>9/22/2023</a:t>
             </a:fld>
             <a:endParaRPr lang="en-US" dirty="0"/>
           </a:p>
@@ -5880,7 +5898,7 @@
             <a:fld id="{48A87A34-81AB-432B-8DAE-1953F412C126}" type="datetimeFigureOut">
               <a:rPr lang="en-US" dirty="0"/>
               <a:pPr/>
-              <a:t>9/22/23</a:t>
+              <a:t>9/22/2023</a:t>
             </a:fld>
             <a:endParaRPr lang="en-US" dirty="0"/>
           </a:p>
@@ -6055,7 +6073,7 @@
           <a:p>
             <a:fld id="{48A87A34-81AB-432B-8DAE-1953F412C126}" type="datetimeFigureOut">
               <a:rPr lang="en-US" dirty="0"/>
-              <a:t>9/22/23</a:t>
+              <a:t>9/22/2023</a:t>
             </a:fld>
             <a:endParaRPr lang="en-US" dirty="0"/>
           </a:p>
@@ -6340,7 +6358,7 @@
             <a:fld id="{48A87A34-81AB-432B-8DAE-1953F412C126}" type="datetimeFigureOut">
               <a:rPr lang="en-US" dirty="0"/>
               <a:pPr/>
-              <a:t>9/22/23</a:t>
+              <a:t>9/22/2023</a:t>
             </a:fld>
             <a:endParaRPr lang="en-US" dirty="0"/>
           </a:p>
@@ -6577,7 +6595,7 @@
           <a:p>
             <a:fld id="{48A87A34-81AB-432B-8DAE-1953F412C126}" type="datetimeFigureOut">
               <a:rPr lang="en-US" dirty="0"/>
-              <a:t>9/22/23</a:t>
+              <a:t>9/22/2023</a:t>
             </a:fld>
             <a:endParaRPr lang="en-US" dirty="0"/>
           </a:p>
@@ -6951,7 +6969,7 @@
           <a:p>
             <a:fld id="{48A87A34-81AB-432B-8DAE-1953F412C126}" type="datetimeFigureOut">
               <a:rPr lang="en-US" dirty="0"/>
-              <a:t>9/22/23</a:t>
+              <a:t>9/22/2023</a:t>
             </a:fld>
             <a:endParaRPr lang="en-US" dirty="0"/>
           </a:p>
@@ -7064,7 +7082,7 @@
           <a:p>
             <a:fld id="{48A87A34-81AB-432B-8DAE-1953F412C126}" type="datetimeFigureOut">
               <a:rPr lang="en-US" dirty="0"/>
-              <a:t>9/22/23</a:t>
+              <a:t>9/22/2023</a:t>
             </a:fld>
             <a:endParaRPr lang="en-US" dirty="0"/>
           </a:p>
@@ -7154,7 +7172,7 @@
           <a:p>
             <a:fld id="{48A87A34-81AB-432B-8DAE-1953F412C126}" type="datetimeFigureOut">
               <a:rPr lang="en-US" dirty="0"/>
-              <a:t>9/22/23</a:t>
+              <a:t>9/22/2023</a:t>
             </a:fld>
             <a:endParaRPr lang="en-US" dirty="0"/>
           </a:p>
@@ -7398,7 +7416,7 @@
           <a:p>
             <a:fld id="{48A87A34-81AB-432B-8DAE-1953F412C126}" type="datetimeFigureOut">
               <a:rPr lang="en-US" dirty="0"/>
-              <a:t>9/22/23</a:t>
+              <a:t>9/22/2023</a:t>
             </a:fld>
             <a:endParaRPr lang="en-US" dirty="0"/>
           </a:p>
@@ -7650,7 +7668,7 @@
           <a:p>
             <a:fld id="{48A87A34-81AB-432B-8DAE-1953F412C126}" type="datetimeFigureOut">
               <a:rPr lang="en-US" dirty="0"/>
-              <a:t>9/22/23</a:t>
+              <a:t>9/22/2023</a:t>
             </a:fld>
             <a:endParaRPr lang="en-US" dirty="0"/>
           </a:p>
@@ -7889,7 +7907,7 @@
             <a:fld id="{48A87A34-81AB-432B-8DAE-1953F412C126}" type="datetimeFigureOut">
               <a:rPr lang="en-US" dirty="0"/>
               <a:pPr/>
-              <a:t>9/22/23</a:t>
+              <a:t>9/22/2023</a:t>
             </a:fld>
             <a:endParaRPr lang="en-US" dirty="0"/>
           </a:p>
@@ -8793,14 +8811,13 @@
           </a:xfrm>
         </p:spPr>
         <p:txBody>
-          <a:bodyPr>
+          <a:bodyPr vert="horz" lIns="91440" tIns="45720" rIns="91440" bIns="45720" rtlCol="0" anchor="t">
             <a:normAutofit/>
           </a:bodyPr>
           <a:lstStyle/>
           <a:p>
             <a:r>
               <a:rPr lang="en-GB" b="1" spc="-5">
-                <a:effectLst/>
                 <a:latin typeface="+mj-lt"/>
                 <a:ea typeface="Times New Roman" panose="02020603050405020304" pitchFamily="18" charset="0"/>
                 <a:cs typeface="Times New Roman" panose="02020603050405020304" pitchFamily="18" charset="0"/>
@@ -8956,6 +8973,1524 @@
     <p:extLst>
       <p:ext uri="{BB962C8B-B14F-4D97-AF65-F5344CB8AC3E}">
         <p14:creationId xmlns:p14="http://schemas.microsoft.com/office/powerpoint/2010/main" val="228615560"/>
+      </p:ext>
+    </p:extLst>
+  </p:cSld>
+  <p:clrMapOvr>
+    <a:masterClrMapping/>
+  </p:clrMapOvr>
+</p:sld>
+</file>
+
+<file path=ppt/slides/slide5.xml><?xml version="1.0" encoding="utf-8"?>
+<p:sld xmlns:a="http://schemas.openxmlformats.org/drawingml/2006/main" xmlns:r="http://schemas.openxmlformats.org/officeDocument/2006/relationships" xmlns:p="http://schemas.openxmlformats.org/presentationml/2006/main">
+  <p:cSld>
+    <p:bg>
+      <p:bgPr>
+        <a:solidFill>
+          <a:schemeClr val="bg1"/>
+        </a:solidFill>
+        <a:effectLst/>
+      </p:bgPr>
+    </p:bg>
+    <p:spTree>
+      <p:nvGrpSpPr>
+        <p:cNvPr id="1" name=""/>
+        <p:cNvGrpSpPr/>
+        <p:nvPr/>
+      </p:nvGrpSpPr>
+      <p:grpSpPr>
+        <a:xfrm>
+          <a:off x="0" y="0"/>
+          <a:ext cx="0" cy="0"/>
+          <a:chOff x="0" y="0"/>
+          <a:chExt cx="0" cy="0"/>
+        </a:xfrm>
+      </p:grpSpPr>
+      <p:sp>
+        <p:nvSpPr>
+          <p:cNvPr id="2" name="Title 1">
+            <a:extLst>
+              <a:ext uri="{FF2B5EF4-FFF2-40B4-BE49-F238E27FC236}">
+                <a16:creationId xmlns:a16="http://schemas.microsoft.com/office/drawing/2014/main" id="{64D4D4AB-DD4C-D7DB-1420-591475AA932B}"/>
+              </a:ext>
+            </a:extLst>
+          </p:cNvPr>
+          <p:cNvSpPr>
+            <a:spLocks noGrp="1"/>
+          </p:cNvSpPr>
+          <p:nvPr>
+            <p:ph type="title"/>
+          </p:nvPr>
+        </p:nvSpPr>
+        <p:spPr>
+          <a:xfrm>
+            <a:off x="2895600" y="764373"/>
+            <a:ext cx="8610600" cy="1293028"/>
+          </a:xfrm>
+        </p:spPr>
+        <p:txBody>
+          <a:bodyPr>
+            <a:normAutofit/>
+          </a:bodyPr>
+          <a:lstStyle/>
+          <a:p>
+            <a:r>
+              <a:rPr lang="en-US" b="1"/>
+              <a:t>Interest rates</a:t>
+            </a:r>
+          </a:p>
+        </p:txBody>
+      </p:sp>
+      <p:graphicFrame>
+        <p:nvGraphicFramePr>
+          <p:cNvPr id="3" name="Content Placeholder 2">
+            <a:extLst>
+              <a:ext uri="{FF2B5EF4-FFF2-40B4-BE49-F238E27FC236}">
+                <a16:creationId xmlns:a16="http://schemas.microsoft.com/office/drawing/2014/main" id="{D28A3956-11A9-E801-16F6-B2C9B499FBD8}"/>
+              </a:ext>
+            </a:extLst>
+          </p:cNvPr>
+          <p:cNvGraphicFramePr>
+            <a:graphicFrameLocks noGrp="1"/>
+          </p:cNvGraphicFramePr>
+          <p:nvPr>
+            <p:ph idx="1"/>
+            <p:extLst>
+              <p:ext uri="{D42A27DB-BD31-4B8C-83A1-F6EECF244321}">
+                <p14:modId xmlns:p14="http://schemas.microsoft.com/office/powerpoint/2010/main" val="2585401950"/>
+              </p:ext>
+            </p:extLst>
+          </p:nvPr>
+        </p:nvGraphicFramePr>
+        <p:xfrm>
+          <a:off x="685800" y="2193925"/>
+          <a:ext cx="10820400" cy="4335584"/>
+        </p:xfrm>
+        <a:graphic>
+          <a:graphicData uri="http://schemas.openxmlformats.org/drawingml/2006/table">
+            <a:tbl>
+              <a:tblPr firstRow="1" bandRow="1">
+                <a:tableStyleId>{5C22544A-7EE6-4342-B048-85BDC9FD1C3A}</a:tableStyleId>
+              </a:tblPr>
+              <a:tblGrid>
+                <a:gridCol w="5410200">
+                  <a:extLst>
+                    <a:ext uri="{9D8B030D-6E8A-4147-A177-3AD203B41FA5}">
+                      <a16:colId xmlns:a16="http://schemas.microsoft.com/office/drawing/2014/main" val="2781908079"/>
+                    </a:ext>
+                  </a:extLst>
+                </a:gridCol>
+                <a:gridCol w="5410200">
+                  <a:extLst>
+                    <a:ext uri="{9D8B030D-6E8A-4147-A177-3AD203B41FA5}">
+                      <a16:colId xmlns:a16="http://schemas.microsoft.com/office/drawing/2014/main" val="3011934463"/>
+                    </a:ext>
+                  </a:extLst>
+                </a:gridCol>
+              </a:tblGrid>
+              <a:tr h="1043744">
+                <a:tc>
+                  <a:txBody>
+                    <a:bodyPr/>
+                    <a:lstStyle/>
+                    <a:p>
+                      <a:pPr algn="ctr"/>
+                      <a:endParaRPr lang="en-GB" sz="2400" b="0" dirty="0">
+                        <a:solidFill>
+                          <a:schemeClr val="bg2">
+                            <a:lumMod val="10000"/>
+                          </a:schemeClr>
+                        </a:solidFill>
+                      </a:endParaRPr>
+                    </a:p>
+                    <a:p>
+                      <a:pPr lvl="0" algn="ctr">
+                        <a:buNone/>
+                      </a:pPr>
+                      <a:r>
+                        <a:rPr lang="en-GB" sz="2400" b="1" dirty="0">
+                          <a:solidFill>
+                            <a:schemeClr val="bg2">
+                              <a:lumMod val="10000"/>
+                            </a:schemeClr>
+                          </a:solidFill>
+                        </a:rPr>
+                        <a:t>Bank of England</a:t>
+                      </a:r>
+                    </a:p>
+                  </a:txBody>
+                  <a:tcPr marL="274320" marR="274320">
+                    <a:lnL w="0">
+                      <a:noFill/>
+                    </a:lnL>
+                    <a:lnR w="0">
+                      <a:noFill/>
+                    </a:lnR>
+                    <a:lnT w="0">
+                      <a:noFill/>
+                    </a:lnT>
+                    <a:lnB w="0">
+                      <a:noFill/>
+                    </a:lnB>
+                    <a:solidFill>
+                      <a:schemeClr val="accent2">
+                        <a:lumMod val="60000"/>
+                        <a:lumOff val="40000"/>
+                      </a:schemeClr>
+                    </a:solidFill>
+                  </a:tcPr>
+                </a:tc>
+                <a:tc>
+                  <a:txBody>
+                    <a:bodyPr/>
+                    <a:lstStyle/>
+                    <a:p>
+                      <a:pPr algn="ctr"/>
+                      <a:endParaRPr lang="en-GB" sz="2400" b="0" dirty="0">
+                        <a:solidFill>
+                          <a:schemeClr val="bg2">
+                            <a:lumMod val="10000"/>
+                          </a:schemeClr>
+                        </a:solidFill>
+                      </a:endParaRPr>
+                    </a:p>
+                    <a:p>
+                      <a:pPr lvl="0" algn="ctr">
+                        <a:buNone/>
+                      </a:pPr>
+                      <a:r>
+                        <a:rPr lang="en-GB" sz="2400" b="1" dirty="0">
+                          <a:solidFill>
+                            <a:schemeClr val="bg2">
+                              <a:lumMod val="10000"/>
+                            </a:schemeClr>
+                          </a:solidFill>
+                        </a:rPr>
+                        <a:t>European Central Bank</a:t>
+                      </a:r>
+                    </a:p>
+                  </a:txBody>
+                  <a:tcPr marL="274320" marR="274320">
+                    <a:lnL w="0">
+                      <a:noFill/>
+                    </a:lnL>
+                    <a:lnR w="0">
+                      <a:noFill/>
+                    </a:lnR>
+                    <a:lnT w="0">
+                      <a:noFill/>
+                    </a:lnT>
+                    <a:lnB w="0">
+                      <a:noFill/>
+                    </a:lnB>
+                    <a:solidFill>
+                      <a:schemeClr val="accent2">
+                        <a:lumMod val="60000"/>
+                        <a:lumOff val="40000"/>
+                      </a:schemeClr>
+                    </a:solidFill>
+                  </a:tcPr>
+                </a:tc>
+                <a:extLst>
+                  <a:ext uri="{0D108BD9-81ED-4DB2-BD59-A6C34878D82A}">
+                    <a16:rowId xmlns:a16="http://schemas.microsoft.com/office/drawing/2014/main" val="1059107952"/>
+                  </a:ext>
+                </a:extLst>
+              </a:tr>
+              <a:tr h="2652852">
+                <a:tc>
+                  <a:txBody>
+                    <a:bodyPr/>
+                    <a:lstStyle/>
+                    <a:p>
+                      <a:endParaRPr lang="en-GB" dirty="0"/>
+                    </a:p>
+                    <a:p>
+                      <a:pPr lvl="0">
+                        <a:buNone/>
+                      </a:pPr>
+                      <a:r>
+                        <a:rPr lang="en-GB" dirty="0"/>
+                        <a:t>BoE has a</a:t>
+                      </a:r>
+                    </a:p>
+                    <a:p>
+                      <a:pPr lvl="0" algn="ctr">
+                        <a:buNone/>
+                      </a:pPr>
+                      <a:r>
+                        <a:rPr lang="en-GB" b="1" dirty="0"/>
+                        <a:t>BASE RATE</a:t>
+                      </a:r>
+                    </a:p>
+                    <a:p>
+                      <a:pPr lvl="0" algn="ctr">
+                        <a:buNone/>
+                      </a:pPr>
+                      <a:endParaRPr lang="en-GB" dirty="0"/>
+                    </a:p>
+                    <a:p>
+                      <a:pPr lvl="0" algn="l">
+                        <a:buNone/>
+                      </a:pPr>
+                      <a:r>
+                        <a:rPr lang="en-GB" dirty="0"/>
+                        <a:t>aka </a:t>
+                      </a:r>
+                      <a:r>
+                        <a:rPr lang="en-GB" i="1" dirty="0"/>
+                        <a:t>bank rate</a:t>
+                      </a:r>
+                      <a:r>
+                        <a:rPr lang="en-GB" dirty="0"/>
+                        <a:t>, aka </a:t>
+                      </a:r>
+                      <a:r>
+                        <a:rPr lang="en-GB" i="1" dirty="0"/>
+                        <a:t>interest rate</a:t>
+                      </a:r>
+                    </a:p>
+                    <a:p>
+                      <a:pPr lvl="0" algn="l">
+                        <a:buNone/>
+                      </a:pPr>
+                      <a:endParaRPr lang="en-GB" dirty="0"/>
+                    </a:p>
+                    <a:p>
+                      <a:pPr lvl="0" algn="l">
+                        <a:buNone/>
+                      </a:pPr>
+                      <a:r>
+                        <a:rPr lang="en-GB" dirty="0"/>
+                        <a:t>that is used to influence other rates in the UK, including rates for loans, mortgages and savings accounts.</a:t>
+                      </a:r>
+                    </a:p>
+                    <a:p>
+                      <a:pPr lvl="0" algn="l">
+                        <a:buNone/>
+                      </a:pPr>
+                      <a:endParaRPr lang="en-GB" dirty="0"/>
+                    </a:p>
+                    <a:p>
+                      <a:pPr lvl="0" algn="l">
+                        <a:buNone/>
+                      </a:pPr>
+                      <a:r>
+                        <a:rPr lang="en-GB" sz="1200" b="0" i="0" u="none" strike="noStrike" noProof="0" dirty="0">
+                          <a:latin typeface="Century Gothic"/>
+                          <a:hlinkClick r:id="rId2"/>
+                        </a:rPr>
+                        <a:t>https://www.bankofengland.co.uk/explainers/why-are-interest-rates-in-the-uk-going-up</a:t>
+                      </a:r>
+                      <a:endParaRPr lang="en-GB" sz="1200" b="0" i="0" u="none" strike="noStrike" noProof="0" dirty="0">
+                        <a:latin typeface="Century Gothic"/>
+                      </a:endParaRPr>
+                    </a:p>
+                  </a:txBody>
+                  <a:tcPr marL="274320" marR="274320">
+                    <a:lnL w="0">
+                      <a:noFill/>
+                    </a:lnL>
+                    <a:lnR w="0">
+                      <a:noFill/>
+                    </a:lnR>
+                    <a:lnT w="0">
+                      <a:noFill/>
+                    </a:lnT>
+                    <a:lnB w="0">
+                      <a:noFill/>
+                    </a:lnB>
+                    <a:solidFill>
+                      <a:schemeClr val="accent2">
+                        <a:lumMod val="20000"/>
+                        <a:lumOff val="80000"/>
+                      </a:schemeClr>
+                    </a:solidFill>
+                  </a:tcPr>
+                </a:tc>
+                <a:tc>
+                  <a:txBody>
+                    <a:bodyPr/>
+                    <a:lstStyle/>
+                    <a:p>
+                      <a:endParaRPr lang="en-GB"/>
+                    </a:p>
+                    <a:p>
+                      <a:pPr lvl="0">
+                        <a:buNone/>
+                      </a:pPr>
+                      <a:r>
+                        <a:rPr lang="en-GB" dirty="0"/>
+                        <a:t>ECB has </a:t>
+                      </a:r>
+                      <a:r>
+                        <a:rPr lang="en-GB" i="1" dirty="0"/>
+                        <a:t>3 KEY INTEREST RATES</a:t>
+                      </a:r>
+                      <a:r>
+                        <a:rPr lang="en-GB" dirty="0"/>
+                        <a:t>:</a:t>
+                      </a:r>
+                    </a:p>
+                    <a:p>
+                      <a:pPr lvl="0">
+                        <a:buNone/>
+                      </a:pPr>
+                      <a:endParaRPr lang="en-GB" dirty="0"/>
+                    </a:p>
+                    <a:p>
+                      <a:pPr lvl="0" algn="ctr">
+                        <a:buNone/>
+                      </a:pPr>
+                      <a:r>
+                        <a:rPr lang="en-GB" sz="1800" b="1" i="0" u="none" strike="noStrike" noProof="0" dirty="0">
+                          <a:latin typeface="Century Gothic"/>
+                        </a:rPr>
+                        <a:t>Deposit Facility</a:t>
+                      </a:r>
+                    </a:p>
+                    <a:p>
+                      <a:pPr lvl="0" algn="ctr">
+                        <a:buNone/>
+                      </a:pPr>
+                      <a:endParaRPr lang="en-GB" sz="1800" b="1" i="0" u="none" strike="noStrike" noProof="0" dirty="0">
+                        <a:latin typeface="Century Gothic"/>
+                      </a:endParaRPr>
+                    </a:p>
+                    <a:p>
+                      <a:pPr lvl="0" algn="ctr">
+                        <a:buNone/>
+                      </a:pPr>
+                      <a:r>
+                        <a:rPr lang="en-GB" sz="1800" b="1" i="0" u="none" strike="noStrike" noProof="0" dirty="0">
+                          <a:latin typeface="Century Gothic"/>
+                        </a:rPr>
+                        <a:t>Fixed Rate Tender</a:t>
+                      </a:r>
+                    </a:p>
+                    <a:p>
+                      <a:pPr lvl="0" algn="ctr">
+                        <a:buNone/>
+                      </a:pPr>
+                      <a:endParaRPr lang="en-GB" sz="1800" b="1" i="0" u="none" strike="noStrike" noProof="0" dirty="0">
+                        <a:latin typeface="Century Gothic"/>
+                      </a:endParaRPr>
+                    </a:p>
+                    <a:p>
+                      <a:pPr lvl="0" algn="ctr">
+                        <a:buNone/>
+                      </a:pPr>
+                      <a:r>
+                        <a:rPr lang="en-GB" sz="1800" b="1" i="0" u="none" strike="noStrike" noProof="0" dirty="0">
+                          <a:latin typeface="Century Gothic"/>
+                        </a:rPr>
+                        <a:t>Marginal Lending</a:t>
+                      </a:r>
+                    </a:p>
+                    <a:p>
+                      <a:pPr lvl="0" algn="ctr">
+                        <a:buNone/>
+                      </a:pPr>
+                      <a:endParaRPr lang="en-GB" sz="1800" b="0" i="0" u="none" strike="noStrike" noProof="0" dirty="0">
+                        <a:latin typeface="Century Gothic"/>
+                      </a:endParaRPr>
+                    </a:p>
+                    <a:p>
+                      <a:pPr lvl="0" algn="l">
+                        <a:buNone/>
+                      </a:pPr>
+                      <a:endParaRPr lang="en-GB" sz="1800" b="0" i="0" u="none" strike="noStrike" noProof="0" dirty="0">
+                        <a:latin typeface="Century Gothic"/>
+                      </a:endParaRPr>
+                    </a:p>
+                    <a:p>
+                      <a:pPr lvl="0" algn="l">
+                        <a:buNone/>
+                      </a:pPr>
+                      <a:r>
+                        <a:rPr lang="en-GB" sz="1200" b="0" i="0" u="none" strike="noStrike" noProof="0" dirty="0">
+                          <a:hlinkClick r:id="rId3"/>
+                        </a:rPr>
+                        <a:t>https://data.ecb.europa.eu/main-figures/ecb-interest-rates-and-exchange-rates/key-ecb-interest-rates</a:t>
+                      </a:r>
+                      <a:r>
+                        <a:rPr lang="en-GB" sz="1800" b="0" i="0" u="none" strike="noStrike" noProof="0" dirty="0"/>
+                        <a:t> </a:t>
+                      </a:r>
+                      <a:endParaRPr lang="en-GB" dirty="0"/>
+                    </a:p>
+                  </a:txBody>
+                  <a:tcPr marL="274320" marR="274320">
+                    <a:lnL w="0">
+                      <a:noFill/>
+                    </a:lnL>
+                    <a:lnR w="0">
+                      <a:noFill/>
+                    </a:lnR>
+                    <a:lnT w="0">
+                      <a:noFill/>
+                    </a:lnT>
+                    <a:lnB w="0">
+                      <a:noFill/>
+                    </a:lnB>
+                    <a:solidFill>
+                      <a:schemeClr val="accent2">
+                        <a:lumMod val="20000"/>
+                        <a:lumOff val="80000"/>
+                      </a:schemeClr>
+                    </a:solidFill>
+                  </a:tcPr>
+                </a:tc>
+                <a:extLst>
+                  <a:ext uri="{0D108BD9-81ED-4DB2-BD59-A6C34878D82A}">
+                    <a16:rowId xmlns:a16="http://schemas.microsoft.com/office/drawing/2014/main" val="974042352"/>
+                  </a:ext>
+                </a:extLst>
+              </a:tr>
+            </a:tbl>
+          </a:graphicData>
+        </a:graphic>
+      </p:graphicFrame>
+    </p:spTree>
+    <p:extLst>
+      <p:ext uri="{BB962C8B-B14F-4D97-AF65-F5344CB8AC3E}">
+        <p14:creationId xmlns:p14="http://schemas.microsoft.com/office/powerpoint/2010/main" val="1192386523"/>
+      </p:ext>
+    </p:extLst>
+  </p:cSld>
+  <p:clrMapOvr>
+    <a:masterClrMapping/>
+  </p:clrMapOvr>
+</p:sld>
+</file>
+
+<file path=ppt/slides/slide6.xml><?xml version="1.0" encoding="utf-8"?>
+<p:sld xmlns:a="http://schemas.openxmlformats.org/drawingml/2006/main" xmlns:r="http://schemas.openxmlformats.org/officeDocument/2006/relationships" xmlns:p="http://schemas.openxmlformats.org/presentationml/2006/main">
+  <p:cSld>
+    <p:bg>
+      <p:bgPr>
+        <a:solidFill>
+          <a:schemeClr val="bg1"/>
+        </a:solidFill>
+        <a:effectLst/>
+      </p:bgPr>
+    </p:bg>
+    <p:spTree>
+      <p:nvGrpSpPr>
+        <p:cNvPr id="1" name=""/>
+        <p:cNvGrpSpPr/>
+        <p:nvPr/>
+      </p:nvGrpSpPr>
+      <p:grpSpPr>
+        <a:xfrm>
+          <a:off x="0" y="0"/>
+          <a:ext cx="0" cy="0"/>
+          <a:chOff x="0" y="0"/>
+          <a:chExt cx="0" cy="0"/>
+        </a:xfrm>
+      </p:grpSpPr>
+      <p:sp>
+        <p:nvSpPr>
+          <p:cNvPr id="2" name="Title 1">
+            <a:extLst>
+              <a:ext uri="{FF2B5EF4-FFF2-40B4-BE49-F238E27FC236}">
+                <a16:creationId xmlns:a16="http://schemas.microsoft.com/office/drawing/2014/main" id="{64D4D4AB-DD4C-D7DB-1420-591475AA932B}"/>
+              </a:ext>
+            </a:extLst>
+          </p:cNvPr>
+          <p:cNvSpPr>
+            <a:spLocks noGrp="1"/>
+          </p:cNvSpPr>
+          <p:nvPr>
+            <p:ph type="title"/>
+          </p:nvPr>
+        </p:nvSpPr>
+        <p:spPr>
+          <a:xfrm>
+            <a:off x="2895600" y="764373"/>
+            <a:ext cx="8610600" cy="1293028"/>
+          </a:xfrm>
+        </p:spPr>
+        <p:txBody>
+          <a:bodyPr>
+            <a:normAutofit/>
+          </a:bodyPr>
+          <a:lstStyle/>
+          <a:p>
+            <a:r>
+              <a:rPr lang="en-US" b="1" dirty="0"/>
+              <a:t>GETTING the data:</a:t>
+            </a:r>
+            <a:br>
+              <a:rPr lang="en-US" b="1" dirty="0"/>
+            </a:br>
+            <a:r>
+              <a:rPr lang="en-US" b="1" dirty="0"/>
+              <a:t> FOREX exchange rates</a:t>
+            </a:r>
+          </a:p>
+        </p:txBody>
+      </p:sp>
+      <p:sp>
+        <p:nvSpPr>
+          <p:cNvPr id="7" name="Content Placeholder 2">
+            <a:extLst>
+              <a:ext uri="{FF2B5EF4-FFF2-40B4-BE49-F238E27FC236}">
+                <a16:creationId xmlns:a16="http://schemas.microsoft.com/office/drawing/2014/main" id="{07F507F8-597F-C432-21BC-91C38D8A418A}"/>
+              </a:ext>
+            </a:extLst>
+          </p:cNvPr>
+          <p:cNvSpPr>
+            <a:spLocks noGrp="1"/>
+          </p:cNvSpPr>
+          <p:nvPr>
+            <p:ph idx="1"/>
+          </p:nvPr>
+        </p:nvSpPr>
+        <p:spPr>
+          <a:xfrm>
+            <a:off x="677333" y="2194560"/>
+            <a:ext cx="5816600" cy="4024125"/>
+          </a:xfrm>
+        </p:spPr>
+        <p:txBody>
+          <a:bodyPr vert="horz" lIns="91440" tIns="45720" rIns="91440" bIns="45720" rtlCol="0" anchor="t">
+            <a:normAutofit/>
+          </a:bodyPr>
+          <a:lstStyle/>
+          <a:p>
+            <a:pPr marL="342900" indent="-342900">
+              <a:buFont typeface="Courier New" panose="02070309020205020404" pitchFamily="49" charset="0"/>
+              <a:buChar char="o"/>
+            </a:pPr>
+            <a:r>
+              <a:rPr lang="en-GB" sz="2000" b="1" spc="-5" dirty="0">
+                <a:latin typeface="+mj-lt"/>
+                <a:ea typeface="Times New Roman" panose="02020603050405020304" pitchFamily="18" charset="0"/>
+                <a:cs typeface="Times New Roman"/>
+              </a:rPr>
+              <a:t>Insert</a:t>
+            </a:r>
+            <a:endParaRPr lang="en-GB" sz="2000" b="1" spc="-5" dirty="0">
+              <a:latin typeface="+mj-lt"/>
+              <a:ea typeface="Times New Roman" panose="02020603050405020304" pitchFamily="18" charset="0"/>
+              <a:cs typeface="Times New Roman" panose="02020603050405020304" pitchFamily="18" charset="0"/>
+            </a:endParaRPr>
+          </a:p>
+          <a:p>
+            <a:pPr marL="342900" indent="-342900">
+              <a:buFont typeface="Courier New" panose="02070309020205020404" pitchFamily="49" charset="0"/>
+              <a:buChar char="o"/>
+            </a:pPr>
+            <a:endParaRPr lang="en-GB" sz="2000" b="1" spc="-5" dirty="0">
+              <a:effectLst/>
+              <a:latin typeface="+mj-lt"/>
+              <a:ea typeface="Times New Roman" panose="02020603050405020304" pitchFamily="18" charset="0"/>
+              <a:cs typeface="Times New Roman" panose="02020603050405020304" pitchFamily="18" charset="0"/>
+            </a:endParaRPr>
+          </a:p>
+          <a:p>
+            <a:pPr marL="342900" lvl="0" indent="-342900">
+              <a:buFont typeface="Courier New" panose="02070309020205020404" pitchFamily="49" charset="0"/>
+              <a:buChar char="o"/>
+            </a:pPr>
+            <a:r>
+              <a:rPr lang="en-GB" sz="2000" b="1" spc="-5" dirty="0">
+                <a:latin typeface="+mj-lt"/>
+                <a:ea typeface="Times New Roman" panose="02020603050405020304" pitchFamily="18" charset="0"/>
+                <a:cs typeface="Times New Roman"/>
+              </a:rPr>
+              <a:t>some</a:t>
+            </a:r>
+            <a:endParaRPr lang="en-GB" sz="2000" b="1" spc="-5" dirty="0">
+              <a:effectLst/>
+              <a:latin typeface="+mj-lt"/>
+              <a:ea typeface="Times New Roman" panose="02020603050405020304" pitchFamily="18" charset="0"/>
+              <a:cs typeface="Times New Roman"/>
+            </a:endParaRPr>
+          </a:p>
+          <a:p>
+            <a:pPr marL="342900" lvl="0" indent="-342900">
+              <a:buFont typeface="Courier New" panose="02070309020205020404" pitchFamily="49" charset="0"/>
+              <a:buChar char="o"/>
+            </a:pPr>
+            <a:endParaRPr lang="en-GB" sz="2000" b="1" spc="-5" dirty="0">
+              <a:effectLst/>
+              <a:latin typeface="+mj-lt"/>
+              <a:ea typeface="Times New Roman" panose="02020603050405020304" pitchFamily="18" charset="0"/>
+              <a:cs typeface="Times New Roman" panose="02020603050405020304" pitchFamily="18" charset="0"/>
+            </a:endParaRPr>
+          </a:p>
+          <a:p>
+            <a:pPr marL="342900" indent="-342900">
+              <a:buFont typeface="Courier New" panose="02070309020205020404" pitchFamily="49" charset="0"/>
+              <a:buChar char="o"/>
+            </a:pPr>
+            <a:r>
+              <a:rPr lang="en-GB" sz="2000" b="1" spc="-5" dirty="0">
+                <a:latin typeface="+mj-lt"/>
+                <a:ea typeface="Times New Roman" panose="02020603050405020304" pitchFamily="18" charset="0"/>
+                <a:cs typeface="Times New Roman"/>
+              </a:rPr>
+              <a:t>Notes</a:t>
+            </a:r>
+            <a:endParaRPr lang="en-GB" sz="2000" b="1" spc="-5" dirty="0">
+              <a:latin typeface="+mj-lt"/>
+              <a:ea typeface="Times New Roman" panose="02020603050405020304" pitchFamily="18" charset="0"/>
+              <a:cs typeface="Times New Roman" panose="02020603050405020304" pitchFamily="18" charset="0"/>
+            </a:endParaRPr>
+          </a:p>
+          <a:p>
+            <a:pPr marL="342900" indent="-342900">
+              <a:buFont typeface="Courier New" panose="02070309020205020404" pitchFamily="49" charset="0"/>
+              <a:buChar char="o"/>
+            </a:pPr>
+            <a:endParaRPr lang="en-GB" sz="2000" b="1" spc="-5" dirty="0">
+              <a:effectLst/>
+              <a:latin typeface="+mj-lt"/>
+              <a:ea typeface="Times New Roman" panose="02020603050405020304" pitchFamily="18" charset="0"/>
+              <a:cs typeface="Times New Roman" panose="02020603050405020304" pitchFamily="18" charset="0"/>
+            </a:endParaRPr>
+          </a:p>
+          <a:p>
+            <a:pPr marL="342900" indent="-342900">
+              <a:buFont typeface="Courier New" panose="02070309020205020404" pitchFamily="49" charset="0"/>
+              <a:buChar char="o"/>
+            </a:pPr>
+            <a:r>
+              <a:rPr lang="en-GB" sz="2000" b="1" spc="-5" dirty="0">
+                <a:cs typeface="Times New Roman"/>
+              </a:rPr>
+              <a:t>@Freeman</a:t>
+            </a:r>
+          </a:p>
+          <a:p>
+            <a:endParaRPr lang="en-US" sz="2000" dirty="0"/>
+          </a:p>
+        </p:txBody>
+      </p:sp>
+    </p:spTree>
+    <p:extLst>
+      <p:ext uri="{BB962C8B-B14F-4D97-AF65-F5344CB8AC3E}">
+        <p14:creationId xmlns:p14="http://schemas.microsoft.com/office/powerpoint/2010/main" val="3040371284"/>
+      </p:ext>
+    </p:extLst>
+  </p:cSld>
+  <p:clrMapOvr>
+    <a:masterClrMapping/>
+  </p:clrMapOvr>
+</p:sld>
+</file>
+
+<file path=ppt/slides/slide7.xml><?xml version="1.0" encoding="utf-8"?>
+<p:sld xmlns:a="http://schemas.openxmlformats.org/drawingml/2006/main" xmlns:r="http://schemas.openxmlformats.org/officeDocument/2006/relationships" xmlns:p="http://schemas.openxmlformats.org/presentationml/2006/main">
+  <p:cSld>
+    <p:bg>
+      <p:bgPr>
+        <a:solidFill>
+          <a:schemeClr val="bg1"/>
+        </a:solidFill>
+        <a:effectLst/>
+      </p:bgPr>
+    </p:bg>
+    <p:spTree>
+      <p:nvGrpSpPr>
+        <p:cNvPr id="1" name=""/>
+        <p:cNvGrpSpPr/>
+        <p:nvPr/>
+      </p:nvGrpSpPr>
+      <p:grpSpPr>
+        <a:xfrm>
+          <a:off x="0" y="0"/>
+          <a:ext cx="0" cy="0"/>
+          <a:chOff x="0" y="0"/>
+          <a:chExt cx="0" cy="0"/>
+        </a:xfrm>
+      </p:grpSpPr>
+      <p:sp>
+        <p:nvSpPr>
+          <p:cNvPr id="2" name="Title 1">
+            <a:extLst>
+              <a:ext uri="{FF2B5EF4-FFF2-40B4-BE49-F238E27FC236}">
+                <a16:creationId xmlns:a16="http://schemas.microsoft.com/office/drawing/2014/main" id="{64D4D4AB-DD4C-D7DB-1420-591475AA932B}"/>
+              </a:ext>
+            </a:extLst>
+          </p:cNvPr>
+          <p:cNvSpPr>
+            <a:spLocks noGrp="1"/>
+          </p:cNvSpPr>
+          <p:nvPr>
+            <p:ph type="title"/>
+          </p:nvPr>
+        </p:nvSpPr>
+        <p:spPr>
+          <a:xfrm>
+            <a:off x="2895600" y="764373"/>
+            <a:ext cx="8610600" cy="1293028"/>
+          </a:xfrm>
+        </p:spPr>
+        <p:txBody>
+          <a:bodyPr>
+            <a:normAutofit/>
+          </a:bodyPr>
+          <a:lstStyle/>
+          <a:p>
+            <a:r>
+              <a:rPr lang="en-US" b="1" dirty="0"/>
+              <a:t>GETTING the data:</a:t>
+            </a:r>
+            <a:br>
+              <a:rPr lang="en-US" b="1" dirty="0"/>
+            </a:br>
+            <a:r>
+              <a:rPr lang="en-US" b="1" dirty="0"/>
+              <a:t>Interest rates</a:t>
+            </a:r>
+          </a:p>
+        </p:txBody>
+      </p:sp>
+      <p:sp>
+        <p:nvSpPr>
+          <p:cNvPr id="7" name="Content Placeholder 2">
+            <a:extLst>
+              <a:ext uri="{FF2B5EF4-FFF2-40B4-BE49-F238E27FC236}">
+                <a16:creationId xmlns:a16="http://schemas.microsoft.com/office/drawing/2014/main" id="{07F507F8-597F-C432-21BC-91C38D8A418A}"/>
+              </a:ext>
+            </a:extLst>
+          </p:cNvPr>
+          <p:cNvSpPr>
+            <a:spLocks noGrp="1"/>
+          </p:cNvSpPr>
+          <p:nvPr>
+            <p:ph idx="1"/>
+          </p:nvPr>
+        </p:nvSpPr>
+        <p:spPr>
+          <a:xfrm>
+            <a:off x="677333" y="2194560"/>
+            <a:ext cx="6636109" cy="4024125"/>
+          </a:xfrm>
+        </p:spPr>
+        <p:txBody>
+          <a:bodyPr vert="horz" lIns="91440" tIns="45720" rIns="91440" bIns="45720" rtlCol="0" anchor="t">
+            <a:normAutofit lnSpcReduction="10000"/>
+          </a:bodyPr>
+          <a:lstStyle/>
+          <a:p>
+            <a:pPr marL="342900" indent="-342900">
+              <a:buFont typeface="Courier New" panose="02070309020205020404" pitchFamily="49" charset="0"/>
+              <a:buChar char="o"/>
+            </a:pPr>
+            <a:r>
+              <a:rPr lang="en-GB" sz="2000" spc="-5" dirty="0">
+                <a:cs typeface="Times New Roman"/>
+              </a:rPr>
+              <a:t>Downloaded from the BoE and ECB databases through their APIs with a Python script</a:t>
+            </a:r>
+          </a:p>
+          <a:p>
+            <a:pPr marL="342900" lvl="0" indent="-342900">
+              <a:buFont typeface="Courier New" panose="02070309020205020404" pitchFamily="49" charset="0"/>
+              <a:buChar char="o"/>
+            </a:pPr>
+            <a:endParaRPr lang="en-GB" sz="2000" dirty="0">
+              <a:effectLst/>
+              <a:latin typeface="+mj-lt"/>
+              <a:ea typeface="Times New Roman" panose="02020603050405020304" pitchFamily="18" charset="0"/>
+              <a:cs typeface="Times New Roman" panose="02020603050405020304" pitchFamily="18" charset="0"/>
+            </a:endParaRPr>
+          </a:p>
+          <a:p>
+            <a:pPr marL="342900" indent="-342900">
+              <a:buFont typeface="Courier New" panose="02070309020205020404" pitchFamily="49" charset="0"/>
+              <a:buChar char="o"/>
+            </a:pPr>
+            <a:r>
+              <a:rPr lang="en-GB" sz="2000" spc="-5" dirty="0">
+                <a:latin typeface="+mj-lt"/>
+                <a:ea typeface="Times New Roman" panose="02020603050405020304" pitchFamily="18" charset="0"/>
+                <a:cs typeface="Times New Roman"/>
+              </a:rPr>
+              <a:t>Loaded as Pandas </a:t>
+            </a:r>
+            <a:r>
+              <a:rPr lang="en-GB" sz="2000" spc="-5" dirty="0" err="1">
+                <a:latin typeface="+mj-lt"/>
+                <a:ea typeface="Times New Roman" panose="02020603050405020304" pitchFamily="18" charset="0"/>
+                <a:cs typeface="Times New Roman"/>
+              </a:rPr>
+              <a:t>dataframes</a:t>
+            </a:r>
+            <a:r>
+              <a:rPr lang="en-GB" sz="2000" spc="-5" dirty="0">
+                <a:latin typeface="+mj-lt"/>
+                <a:ea typeface="Times New Roman" panose="02020603050405020304" pitchFamily="18" charset="0"/>
+                <a:cs typeface="Times New Roman"/>
+              </a:rPr>
+              <a:t>, </a:t>
+            </a:r>
+            <a:r>
+              <a:rPr lang="en-GB" sz="2000" spc="-5" dirty="0" err="1">
+                <a:latin typeface="+mj-lt"/>
+                <a:ea typeface="Times New Roman" panose="02020603050405020304" pitchFamily="18" charset="0"/>
+                <a:cs typeface="Times New Roman"/>
+              </a:rPr>
+              <a:t>transformend</a:t>
+            </a:r>
+            <a:r>
+              <a:rPr lang="en-GB" sz="2000" spc="-5" dirty="0">
+                <a:latin typeface="+mj-lt"/>
+                <a:ea typeface="Times New Roman" panose="02020603050405020304" pitchFamily="18" charset="0"/>
+                <a:cs typeface="Times New Roman"/>
+              </a:rPr>
+              <a:t> into a matching format and  merged into one single .csv file</a:t>
+            </a:r>
+            <a:endParaRPr lang="en-GB" sz="2000" spc="-5" dirty="0">
+              <a:effectLst/>
+              <a:latin typeface="+mj-lt"/>
+              <a:ea typeface="Times New Roman" panose="02020603050405020304" pitchFamily="18" charset="0"/>
+              <a:cs typeface="Times New Roman" panose="02020603050405020304" pitchFamily="18" charset="0"/>
+            </a:endParaRPr>
+          </a:p>
+          <a:p>
+            <a:pPr marL="0" lvl="0" indent="0">
+              <a:buNone/>
+            </a:pPr>
+            <a:endParaRPr lang="en-GB" sz="2000" dirty="0">
+              <a:effectLst/>
+              <a:latin typeface="+mj-lt"/>
+              <a:ea typeface="Times New Roman" panose="02020603050405020304" pitchFamily="18" charset="0"/>
+              <a:cs typeface="Times New Roman" panose="02020603050405020304" pitchFamily="18" charset="0"/>
+            </a:endParaRPr>
+          </a:p>
+          <a:p>
+            <a:pPr marL="342900" indent="-342900">
+              <a:buFont typeface="Courier New" panose="02070309020205020404" pitchFamily="49" charset="0"/>
+              <a:buChar char="o"/>
+            </a:pPr>
+            <a:r>
+              <a:rPr lang="en-GB" sz="2000" spc="-5" dirty="0">
+                <a:effectLst/>
+                <a:latin typeface="+mj-lt"/>
+                <a:ea typeface="Times New Roman" panose="02020603050405020304" pitchFamily="18" charset="0"/>
+                <a:cs typeface="Times New Roman"/>
+              </a:rPr>
+              <a:t>.</a:t>
+            </a:r>
+            <a:r>
+              <a:rPr lang="en-GB" sz="2000" spc="-5" dirty="0">
+                <a:latin typeface="+mj-lt"/>
+                <a:ea typeface="Times New Roman" panose="02020603050405020304" pitchFamily="18" charset="0"/>
+                <a:cs typeface="Times New Roman"/>
+              </a:rPr>
+              <a:t>csv data in 5 columns:</a:t>
+            </a:r>
+            <a:endParaRPr lang="en-GB" sz="2000" dirty="0">
+              <a:effectLst/>
+              <a:latin typeface="+mj-lt"/>
+              <a:ea typeface="Times New Roman" panose="02020603050405020304" pitchFamily="18" charset="0"/>
+              <a:cs typeface="Times New Roman"/>
+            </a:endParaRPr>
+          </a:p>
+          <a:p>
+            <a:pPr marL="800100" lvl="1" indent="-342900">
+              <a:buFont typeface="Courier New" panose="02070309020205020404" pitchFamily="49" charset="0"/>
+              <a:buChar char="o"/>
+            </a:pPr>
+            <a:r>
+              <a:rPr lang="en-GB" sz="1800" spc="-5" dirty="0">
+                <a:cs typeface="Times New Roman"/>
+              </a:rPr>
+              <a:t>Date as AAAA-MM-DD</a:t>
+            </a:r>
+          </a:p>
+          <a:p>
+            <a:pPr marL="800100" lvl="1" indent="-342900">
+              <a:buFont typeface="Courier New" panose="02070309020205020404" pitchFamily="49" charset="0"/>
+              <a:buChar char="o"/>
+            </a:pPr>
+            <a:r>
+              <a:rPr lang="en-GB" sz="1800" spc="-5" dirty="0">
+                <a:cs typeface="Times New Roman"/>
+              </a:rPr>
+              <a:t>BoE base rate</a:t>
+            </a:r>
+          </a:p>
+          <a:p>
+            <a:pPr marL="800100" lvl="1" indent="-342900">
+              <a:buFont typeface="Courier New" panose="02070309020205020404" pitchFamily="49" charset="0"/>
+              <a:buChar char="o"/>
+            </a:pPr>
+            <a:r>
+              <a:rPr lang="en-GB" sz="1800" spc="-5" dirty="0">
+                <a:cs typeface="Times New Roman"/>
+              </a:rPr>
+              <a:t>ECB deposit facility</a:t>
+            </a:r>
+          </a:p>
+          <a:p>
+            <a:pPr marL="800100" lvl="1" indent="-342900">
+              <a:buFont typeface="Courier New" panose="02070309020205020404" pitchFamily="49" charset="0"/>
+              <a:buChar char="o"/>
+            </a:pPr>
+            <a:r>
+              <a:rPr lang="en-GB" sz="1800" spc="-5" dirty="0">
+                <a:cs typeface="Times New Roman"/>
+              </a:rPr>
+              <a:t>ECB fixed rate tender</a:t>
+            </a:r>
+          </a:p>
+          <a:p>
+            <a:pPr marL="800100" lvl="1" indent="-342900">
+              <a:buFont typeface="Courier New" panose="02070309020205020404" pitchFamily="49" charset="0"/>
+              <a:buChar char="o"/>
+            </a:pPr>
+            <a:r>
+              <a:rPr lang="en-GB" sz="1800" spc="-5" dirty="0">
+                <a:cs typeface="Times New Roman"/>
+              </a:rPr>
+              <a:t>ECB marginal lending</a:t>
+            </a:r>
+          </a:p>
+          <a:p>
+            <a:endParaRPr lang="en-US" sz="2000" dirty="0"/>
+          </a:p>
+        </p:txBody>
+      </p:sp>
+      <p:sp>
+        <p:nvSpPr>
+          <p:cNvPr id="3" name="Cylinder 2">
+            <a:extLst>
+              <a:ext uri="{FF2B5EF4-FFF2-40B4-BE49-F238E27FC236}">
+                <a16:creationId xmlns:a16="http://schemas.microsoft.com/office/drawing/2014/main" id="{7AA994B9-7413-BE90-C140-E1D12E24B05F}"/>
+              </a:ext>
+            </a:extLst>
+          </p:cNvPr>
+          <p:cNvSpPr/>
+          <p:nvPr/>
+        </p:nvSpPr>
+        <p:spPr>
+          <a:xfrm>
+            <a:off x="8655169" y="2286000"/>
+            <a:ext cx="1754036" cy="934528"/>
+          </a:xfrm>
+          <a:prstGeom prst="can">
+            <a:avLst/>
+          </a:prstGeom>
+        </p:spPr>
+        <p:style>
+          <a:lnRef idx="2">
+            <a:schemeClr val="accent1">
+              <a:shade val="15000"/>
+            </a:schemeClr>
+          </a:lnRef>
+          <a:fillRef idx="1">
+            <a:schemeClr val="accent1"/>
+          </a:fillRef>
+          <a:effectRef idx="0">
+            <a:schemeClr val="accent1"/>
+          </a:effectRef>
+          <a:fontRef idx="minor">
+            <a:schemeClr val="lt1"/>
+          </a:fontRef>
+        </p:style>
+        <p:txBody>
+          <a:bodyPr rtlCol="0" anchor="ctr"/>
+          <a:lstStyle/>
+          <a:p>
+            <a:pPr algn="ctr"/>
+            <a:r>
+              <a:rPr lang="en-GB" sz="1600" dirty="0"/>
+              <a:t>BoE &amp; ECB</a:t>
+            </a:r>
+          </a:p>
+          <a:p>
+            <a:pPr algn="ctr"/>
+            <a:r>
+              <a:rPr lang="en-GB" sz="1600" dirty="0"/>
+              <a:t>databases</a:t>
+            </a:r>
+          </a:p>
+        </p:txBody>
+      </p:sp>
+      <p:sp>
+        <p:nvSpPr>
+          <p:cNvPr id="4" name="Flowchart: Document 3">
+            <a:extLst>
+              <a:ext uri="{FF2B5EF4-FFF2-40B4-BE49-F238E27FC236}">
+                <a16:creationId xmlns:a16="http://schemas.microsoft.com/office/drawing/2014/main" id="{32D021B8-2C9E-8009-549D-E81BE653A893}"/>
+              </a:ext>
+            </a:extLst>
+          </p:cNvPr>
+          <p:cNvSpPr/>
+          <p:nvPr/>
+        </p:nvSpPr>
+        <p:spPr>
+          <a:xfrm>
+            <a:off x="8195095" y="5650301"/>
+            <a:ext cx="2674187" cy="1020792"/>
+          </a:xfrm>
+          <a:prstGeom prst="flowChartDocument">
+            <a:avLst/>
+          </a:prstGeom>
+        </p:spPr>
+        <p:style>
+          <a:lnRef idx="2">
+            <a:schemeClr val="accent1">
+              <a:shade val="15000"/>
+            </a:schemeClr>
+          </a:lnRef>
+          <a:fillRef idx="1">
+            <a:schemeClr val="accent1"/>
+          </a:fillRef>
+          <a:effectRef idx="0">
+            <a:schemeClr val="accent1"/>
+          </a:effectRef>
+          <a:fontRef idx="minor">
+            <a:schemeClr val="lt1"/>
+          </a:fontRef>
+        </p:style>
+        <p:txBody>
+          <a:bodyPr rtlCol="0" anchor="ctr"/>
+          <a:lstStyle/>
+          <a:p>
+            <a:pPr algn="ctr"/>
+            <a:r>
+              <a:rPr lang="en-GB" sz="1600" dirty="0"/>
+              <a:t>CSV file:</a:t>
+            </a:r>
+            <a:endParaRPr lang="en-US" sz="1600"/>
+          </a:p>
+          <a:p>
+            <a:pPr algn="ctr"/>
+            <a:r>
+              <a:rPr lang="en-GB" sz="1600" dirty="0"/>
+              <a:t>Date, rate1, rate2, …</a:t>
+            </a:r>
+          </a:p>
+        </p:txBody>
+      </p:sp>
+      <p:sp>
+        <p:nvSpPr>
+          <p:cNvPr id="5" name="Flowchart: Preparation 4">
+            <a:extLst>
+              <a:ext uri="{FF2B5EF4-FFF2-40B4-BE49-F238E27FC236}">
+                <a16:creationId xmlns:a16="http://schemas.microsoft.com/office/drawing/2014/main" id="{89B68418-15C4-096C-119E-C01FFC41FF35}"/>
+              </a:ext>
+            </a:extLst>
+          </p:cNvPr>
+          <p:cNvSpPr/>
+          <p:nvPr/>
+        </p:nvSpPr>
+        <p:spPr>
+          <a:xfrm>
+            <a:off x="8568905" y="3881886"/>
+            <a:ext cx="1797169" cy="1092679"/>
+          </a:xfrm>
+          <a:prstGeom prst="flowChartPreparation">
+            <a:avLst/>
+          </a:prstGeom>
+        </p:spPr>
+        <p:style>
+          <a:lnRef idx="2">
+            <a:schemeClr val="accent1">
+              <a:shade val="15000"/>
+            </a:schemeClr>
+          </a:lnRef>
+          <a:fillRef idx="1">
+            <a:schemeClr val="accent1"/>
+          </a:fillRef>
+          <a:effectRef idx="0">
+            <a:schemeClr val="accent1"/>
+          </a:effectRef>
+          <a:fontRef idx="minor">
+            <a:schemeClr val="lt1"/>
+          </a:fontRef>
+        </p:style>
+        <p:txBody>
+          <a:bodyPr rtlCol="0" anchor="ctr"/>
+          <a:lstStyle/>
+          <a:p>
+            <a:pPr algn="ctr"/>
+            <a:r>
+              <a:rPr lang="en-GB" sz="1600" dirty="0"/>
+              <a:t>Python script: ETL</a:t>
+            </a:r>
+          </a:p>
+        </p:txBody>
+      </p:sp>
+      <p:cxnSp>
+        <p:nvCxnSpPr>
+          <p:cNvPr id="6" name="Straight Arrow Connector 5">
+            <a:extLst>
+              <a:ext uri="{FF2B5EF4-FFF2-40B4-BE49-F238E27FC236}">
+                <a16:creationId xmlns:a16="http://schemas.microsoft.com/office/drawing/2014/main" id="{9ED58427-E6C6-4E4E-1F3A-DF1B24582397}"/>
+              </a:ext>
+            </a:extLst>
+          </p:cNvPr>
+          <p:cNvCxnSpPr/>
+          <p:nvPr/>
+        </p:nvCxnSpPr>
+        <p:spPr>
+          <a:xfrm>
+            <a:off x="9448800" y="3259347"/>
+            <a:ext cx="8627" cy="583721"/>
+          </a:xfrm>
+          <a:prstGeom prst="straightConnector1">
+            <a:avLst/>
+          </a:prstGeom>
+          <a:ln w="57150">
+            <a:solidFill>
+              <a:srgbClr val="FF0000"/>
+            </a:solidFill>
+            <a:headEnd type="triangle"/>
+            <a:tailEnd type="triangle"/>
+          </a:ln>
+        </p:spPr>
+        <p:style>
+          <a:lnRef idx="1">
+            <a:schemeClr val="accent1"/>
+          </a:lnRef>
+          <a:fillRef idx="0">
+            <a:schemeClr val="accent1"/>
+          </a:fillRef>
+          <a:effectRef idx="0">
+            <a:schemeClr val="accent1"/>
+          </a:effectRef>
+          <a:fontRef idx="minor">
+            <a:schemeClr val="tx1"/>
+          </a:fontRef>
+        </p:style>
+      </p:cxnSp>
+      <p:cxnSp>
+        <p:nvCxnSpPr>
+          <p:cNvPr id="9" name="Straight Arrow Connector 8">
+            <a:extLst>
+              <a:ext uri="{FF2B5EF4-FFF2-40B4-BE49-F238E27FC236}">
+                <a16:creationId xmlns:a16="http://schemas.microsoft.com/office/drawing/2014/main" id="{3169101A-0E06-4588-10D3-1FF8A2415D46}"/>
+              </a:ext>
+            </a:extLst>
+          </p:cNvPr>
+          <p:cNvCxnSpPr/>
+          <p:nvPr/>
+        </p:nvCxnSpPr>
+        <p:spPr>
+          <a:xfrm flipH="1">
+            <a:off x="9455629" y="5025966"/>
+            <a:ext cx="5751" cy="626852"/>
+          </a:xfrm>
+          <a:prstGeom prst="straightConnector1">
+            <a:avLst/>
+          </a:prstGeom>
+          <a:ln w="57150">
+            <a:solidFill>
+              <a:srgbClr val="FF0000"/>
+            </a:solidFill>
+            <a:tailEnd type="triangle"/>
+          </a:ln>
+        </p:spPr>
+        <p:style>
+          <a:lnRef idx="1">
+            <a:schemeClr val="accent1"/>
+          </a:lnRef>
+          <a:fillRef idx="0">
+            <a:schemeClr val="accent1"/>
+          </a:fillRef>
+          <a:effectRef idx="0">
+            <a:schemeClr val="accent1"/>
+          </a:effectRef>
+          <a:fontRef idx="minor">
+            <a:schemeClr val="tx1"/>
+          </a:fontRef>
+        </p:style>
+      </p:cxnSp>
+    </p:spTree>
+    <p:extLst>
+      <p:ext uri="{BB962C8B-B14F-4D97-AF65-F5344CB8AC3E}">
+        <p14:creationId xmlns:p14="http://schemas.microsoft.com/office/powerpoint/2010/main" val="1988380055"/>
+      </p:ext>
+    </p:extLst>
+  </p:cSld>
+  <p:clrMapOvr>
+    <a:masterClrMapping/>
+  </p:clrMapOvr>
+</p:sld>
+</file>
+
+<file path=ppt/slides/slide8.xml><?xml version="1.0" encoding="utf-8"?>
+<p:sld xmlns:a="http://schemas.openxmlformats.org/drawingml/2006/main" xmlns:r="http://schemas.openxmlformats.org/officeDocument/2006/relationships" xmlns:p="http://schemas.openxmlformats.org/presentationml/2006/main">
+  <p:cSld>
+    <p:bg>
+      <p:bgPr>
+        <a:solidFill>
+          <a:schemeClr val="bg1"/>
+        </a:solidFill>
+        <a:effectLst/>
+      </p:bgPr>
+    </p:bg>
+    <p:spTree>
+      <p:nvGrpSpPr>
+        <p:cNvPr id="1" name=""/>
+        <p:cNvGrpSpPr/>
+        <p:nvPr/>
+      </p:nvGrpSpPr>
+      <p:grpSpPr>
+        <a:xfrm>
+          <a:off x="0" y="0"/>
+          <a:ext cx="0" cy="0"/>
+          <a:chOff x="0" y="0"/>
+          <a:chExt cx="0" cy="0"/>
+        </a:xfrm>
+      </p:grpSpPr>
+      <p:sp>
+        <p:nvSpPr>
+          <p:cNvPr id="2" name="Title 1">
+            <a:extLst>
+              <a:ext uri="{FF2B5EF4-FFF2-40B4-BE49-F238E27FC236}">
+                <a16:creationId xmlns:a16="http://schemas.microsoft.com/office/drawing/2014/main" id="{64D4D4AB-DD4C-D7DB-1420-591475AA932B}"/>
+              </a:ext>
+            </a:extLst>
+          </p:cNvPr>
+          <p:cNvSpPr>
+            <a:spLocks noGrp="1"/>
+          </p:cNvSpPr>
+          <p:nvPr>
+            <p:ph type="title"/>
+          </p:nvPr>
+        </p:nvSpPr>
+        <p:spPr>
+          <a:xfrm>
+            <a:off x="2895600" y="764373"/>
+            <a:ext cx="8610600" cy="1293028"/>
+          </a:xfrm>
+        </p:spPr>
+        <p:txBody>
+          <a:bodyPr>
+            <a:normAutofit/>
+          </a:bodyPr>
+          <a:lstStyle/>
+          <a:p>
+            <a:r>
+              <a:rPr lang="en-US" b="1" dirty="0" err="1"/>
+              <a:t>ANALysis</a:t>
+            </a:r>
+          </a:p>
+        </p:txBody>
+      </p:sp>
+      <p:sp>
+        <p:nvSpPr>
+          <p:cNvPr id="7" name="Content Placeholder 2">
+            <a:extLst>
+              <a:ext uri="{FF2B5EF4-FFF2-40B4-BE49-F238E27FC236}">
+                <a16:creationId xmlns:a16="http://schemas.microsoft.com/office/drawing/2014/main" id="{07F507F8-597F-C432-21BC-91C38D8A418A}"/>
+              </a:ext>
+            </a:extLst>
+          </p:cNvPr>
+          <p:cNvSpPr>
+            <a:spLocks noGrp="1"/>
+          </p:cNvSpPr>
+          <p:nvPr>
+            <p:ph idx="1"/>
+          </p:nvPr>
+        </p:nvSpPr>
+        <p:spPr>
+          <a:xfrm>
+            <a:off x="677333" y="2194560"/>
+            <a:ext cx="6636109" cy="4024125"/>
+          </a:xfrm>
+        </p:spPr>
+        <p:txBody>
+          <a:bodyPr vert="horz" lIns="91440" tIns="45720" rIns="91440" bIns="45720" rtlCol="0" anchor="t">
+            <a:normAutofit/>
+          </a:bodyPr>
+          <a:lstStyle/>
+          <a:p>
+            <a:pPr marL="0" indent="0">
+              <a:buNone/>
+            </a:pPr>
+            <a:r>
+              <a:rPr lang="en-GB" sz="2000" dirty="0">
+                <a:latin typeface="+mj-lt"/>
+                <a:ea typeface="Times New Roman" panose="02020603050405020304" pitchFamily="18" charset="0"/>
+                <a:cs typeface="Times New Roman"/>
+              </a:rPr>
+              <a:t>SOMETHING </a:t>
+            </a:r>
+            <a:endParaRPr lang="en-GB" sz="2000" dirty="0">
+              <a:effectLst/>
+              <a:latin typeface="+mj-lt"/>
+              <a:ea typeface="Times New Roman" panose="02020603050405020304" pitchFamily="18" charset="0"/>
+              <a:cs typeface="Times New Roman" panose="02020603050405020304" pitchFamily="18" charset="0"/>
+            </a:endParaRPr>
+          </a:p>
+          <a:p>
+            <a:pPr marL="0" indent="0">
+              <a:buNone/>
+            </a:pPr>
+            <a:r>
+              <a:rPr lang="en-GB" sz="2000" dirty="0">
+                <a:cs typeface="Times New Roman"/>
+              </a:rPr>
+              <a:t>HERE :)</a:t>
+            </a:r>
+          </a:p>
+          <a:p>
+            <a:pPr marL="342900" indent="-342900">
+              <a:buFont typeface="Courier New" panose="02070309020205020404" pitchFamily="49" charset="0"/>
+              <a:buChar char="o"/>
+            </a:pPr>
+            <a:endParaRPr lang="en-GB" sz="1800" spc="-5" dirty="0">
+              <a:cs typeface="Times New Roman"/>
+            </a:endParaRPr>
+          </a:p>
+        </p:txBody>
+      </p:sp>
+    </p:spTree>
+    <p:extLst>
+      <p:ext uri="{BB962C8B-B14F-4D97-AF65-F5344CB8AC3E}">
+        <p14:creationId xmlns:p14="http://schemas.microsoft.com/office/powerpoint/2010/main" val="1883336724"/>
+      </p:ext>
+    </p:extLst>
+  </p:cSld>
+  <p:clrMapOvr>
+    <a:masterClrMapping/>
+  </p:clrMapOvr>
+</p:sld>
+</file>
+
+<file path=ppt/slides/slide9.xml><?xml version="1.0" encoding="utf-8"?>
+<p:sld xmlns:a="http://schemas.openxmlformats.org/drawingml/2006/main" xmlns:r="http://schemas.openxmlformats.org/officeDocument/2006/relationships" xmlns:p="http://schemas.openxmlformats.org/presentationml/2006/main">
+  <p:cSld>
+    <p:bg>
+      <p:bgPr>
+        <a:solidFill>
+          <a:schemeClr val="bg1"/>
+        </a:solidFill>
+        <a:effectLst/>
+      </p:bgPr>
+    </p:bg>
+    <p:spTree>
+      <p:nvGrpSpPr>
+        <p:cNvPr id="1" name=""/>
+        <p:cNvGrpSpPr/>
+        <p:nvPr/>
+      </p:nvGrpSpPr>
+      <p:grpSpPr>
+        <a:xfrm>
+          <a:off x="0" y="0"/>
+          <a:ext cx="0" cy="0"/>
+          <a:chOff x="0" y="0"/>
+          <a:chExt cx="0" cy="0"/>
+        </a:xfrm>
+      </p:grpSpPr>
+      <p:sp>
+        <p:nvSpPr>
+          <p:cNvPr id="2" name="Title 1">
+            <a:extLst>
+              <a:ext uri="{FF2B5EF4-FFF2-40B4-BE49-F238E27FC236}">
+                <a16:creationId xmlns:a16="http://schemas.microsoft.com/office/drawing/2014/main" id="{64D4D4AB-DD4C-D7DB-1420-591475AA932B}"/>
+              </a:ext>
+            </a:extLst>
+          </p:cNvPr>
+          <p:cNvSpPr>
+            <a:spLocks noGrp="1"/>
+          </p:cNvSpPr>
+          <p:nvPr>
+            <p:ph type="title"/>
+          </p:nvPr>
+        </p:nvSpPr>
+        <p:spPr>
+          <a:xfrm>
+            <a:off x="2895600" y="764373"/>
+            <a:ext cx="8610600" cy="1293028"/>
+          </a:xfrm>
+        </p:spPr>
+        <p:txBody>
+          <a:bodyPr>
+            <a:normAutofit/>
+          </a:bodyPr>
+          <a:lstStyle/>
+          <a:p>
+            <a:r>
+              <a:rPr lang="en-US" b="1"/>
+              <a:t>Analysis</a:t>
+            </a:r>
+          </a:p>
+        </p:txBody>
+      </p:sp>
+      <p:sp>
+        <p:nvSpPr>
+          <p:cNvPr id="7" name="Content Placeholder 2">
+            <a:extLst>
+              <a:ext uri="{FF2B5EF4-FFF2-40B4-BE49-F238E27FC236}">
+                <a16:creationId xmlns:a16="http://schemas.microsoft.com/office/drawing/2014/main" id="{07F507F8-597F-C432-21BC-91C38D8A418A}"/>
+              </a:ext>
+            </a:extLst>
+          </p:cNvPr>
+          <p:cNvSpPr>
+            <a:spLocks noGrp="1"/>
+          </p:cNvSpPr>
+          <p:nvPr>
+            <p:ph idx="1"/>
+          </p:nvPr>
+        </p:nvSpPr>
+        <p:spPr>
+          <a:xfrm>
+            <a:off x="677333" y="2194560"/>
+            <a:ext cx="6636109" cy="4024125"/>
+          </a:xfrm>
+        </p:spPr>
+        <p:txBody>
+          <a:bodyPr vert="horz" lIns="91440" tIns="45720" rIns="91440" bIns="45720" rtlCol="0" anchor="t">
+            <a:normAutofit/>
+          </a:bodyPr>
+          <a:lstStyle/>
+          <a:p>
+            <a:pPr marL="0" indent="0">
+              <a:buNone/>
+            </a:pPr>
+            <a:r>
+              <a:rPr lang="en-GB" sz="2000" dirty="0">
+                <a:latin typeface="+mj-lt"/>
+                <a:ea typeface="Times New Roman" panose="02020603050405020304" pitchFamily="18" charset="0"/>
+                <a:cs typeface="Times New Roman"/>
+              </a:rPr>
+              <a:t>SOMETHING </a:t>
+            </a:r>
+            <a:endParaRPr lang="en-GB" sz="2000" dirty="0">
+              <a:effectLst/>
+              <a:latin typeface="+mj-lt"/>
+              <a:ea typeface="Times New Roman" panose="02020603050405020304" pitchFamily="18" charset="0"/>
+              <a:cs typeface="Times New Roman" panose="02020603050405020304" pitchFamily="18" charset="0"/>
+            </a:endParaRPr>
+          </a:p>
+          <a:p>
+            <a:pPr marL="0" indent="0">
+              <a:buNone/>
+            </a:pPr>
+            <a:r>
+              <a:rPr lang="en-GB" sz="2000" dirty="0">
+                <a:cs typeface="Times New Roman"/>
+              </a:rPr>
+              <a:t>HERE :)</a:t>
+            </a:r>
+          </a:p>
+          <a:p>
+            <a:pPr marL="342900" indent="-342900">
+              <a:buFont typeface="Courier New" panose="02070309020205020404" pitchFamily="49" charset="0"/>
+              <a:buChar char="o"/>
+            </a:pPr>
+            <a:endParaRPr lang="en-GB" sz="1800" spc="-5" dirty="0">
+              <a:cs typeface="Times New Roman"/>
+            </a:endParaRPr>
+          </a:p>
+        </p:txBody>
+      </p:sp>
+    </p:spTree>
+    <p:extLst>
+      <p:ext uri="{BB962C8B-B14F-4D97-AF65-F5344CB8AC3E}">
+        <p14:creationId xmlns:p14="http://schemas.microsoft.com/office/powerpoint/2010/main" val="2726262949"/>
       </p:ext>
     </p:extLst>
   </p:cSld>

</xml_diff>